<commit_message>
finish first partpart of compare
</commit_message>
<xml_diff>
--- a/ppt/若愚－深入透视P2P网贷平台.pptx
+++ b/ppt/若愚－深入透视P2P网贷平台.pptx
@@ -209,7 +209,7 @@
           <a:p>
             <a:fld id="{70D8A22F-5AB3-8E41-AEDE-A7D79EE396D5}" type="datetimeFigureOut">
               <a:rPr kumimoji="1" lang="zh-CN" altLang="en-US" smtClean="0"/>
-              <a:t>16/3/30</a:t>
+              <a:t>16/3/31</a:t>
             </a:fld>
             <a:endParaRPr kumimoji="1" lang="zh-CN" altLang="en-US"/>
           </a:p>
@@ -374,7 +374,7 @@
           <a:p>
             <a:fld id="{AF75DEA5-EA8C-E247-97ED-C4C8E7E2D762}" type="datetimeFigureOut">
               <a:rPr kumimoji="1" lang="zh-CN" altLang="en-US" smtClean="0"/>
-              <a:t>16/3/30</a:t>
+              <a:t>16/3/31</a:t>
             </a:fld>
             <a:endParaRPr kumimoji="1" lang="zh-CN" altLang="en-US"/>
           </a:p>
@@ -1985,7 +1985,7 @@
             <a:fld id="{8E36636D-D922-432D-A958-524484B5923D}" type="datetimeFigureOut">
               <a:rPr lang="en-US" smtClean="0"/>
               <a:pPr/>
-              <a:t>16/3/30</a:t>
+              <a:t>16/3/31</a:t>
             </a:fld>
             <a:endParaRPr lang="en-US"/>
           </a:p>
@@ -2152,7 +2152,7 @@
             <a:fld id="{8E36636D-D922-432D-A958-524484B5923D}" type="datetimeFigureOut">
               <a:rPr lang="en-US" smtClean="0"/>
               <a:pPr/>
-              <a:t>16/3/30</a:t>
+              <a:t>16/3/31</a:t>
             </a:fld>
             <a:endParaRPr lang="en-US"/>
           </a:p>
@@ -2329,7 +2329,7 @@
             <a:fld id="{8E36636D-D922-432D-A958-524484B5923D}" type="datetimeFigureOut">
               <a:rPr lang="en-US" smtClean="0"/>
               <a:pPr/>
-              <a:t>16/3/30</a:t>
+              <a:t>16/3/31</a:t>
             </a:fld>
             <a:endParaRPr lang="en-US"/>
           </a:p>
@@ -2496,7 +2496,7 @@
             <a:fld id="{8E36636D-D922-432D-A958-524484B5923D}" type="datetimeFigureOut">
               <a:rPr lang="en-US" smtClean="0"/>
               <a:pPr/>
-              <a:t>16/3/30</a:t>
+              <a:t>16/3/31</a:t>
             </a:fld>
             <a:endParaRPr lang="en-US"/>
           </a:p>
@@ -2737,7 +2737,7 @@
             <a:fld id="{8E36636D-D922-432D-A958-524484B5923D}" type="datetimeFigureOut">
               <a:rPr lang="en-US" smtClean="0"/>
               <a:pPr/>
-              <a:t>16/3/30</a:t>
+              <a:t>16/3/31</a:t>
             </a:fld>
             <a:endParaRPr lang="en-US"/>
           </a:p>
@@ -3022,7 +3022,7 @@
             <a:fld id="{8E36636D-D922-432D-A958-524484B5923D}" type="datetimeFigureOut">
               <a:rPr lang="en-US" smtClean="0"/>
               <a:pPr/>
-              <a:t>16/3/30</a:t>
+              <a:t>16/3/31</a:t>
             </a:fld>
             <a:endParaRPr lang="en-US"/>
           </a:p>
@@ -3441,7 +3441,7 @@
             <a:fld id="{8E36636D-D922-432D-A958-524484B5923D}" type="datetimeFigureOut">
               <a:rPr lang="en-US" smtClean="0"/>
               <a:pPr/>
-              <a:t>16/3/30</a:t>
+              <a:t>16/3/31</a:t>
             </a:fld>
             <a:endParaRPr lang="en-US"/>
           </a:p>
@@ -3556,7 +3556,7 @@
             <a:fld id="{8E36636D-D922-432D-A958-524484B5923D}" type="datetimeFigureOut">
               <a:rPr lang="en-US" smtClean="0"/>
               <a:pPr/>
-              <a:t>16/3/30</a:t>
+              <a:t>16/3/31</a:t>
             </a:fld>
             <a:endParaRPr lang="en-US"/>
           </a:p>
@@ -3648,7 +3648,7 @@
             <a:fld id="{8E36636D-D922-432D-A958-524484B5923D}" type="datetimeFigureOut">
               <a:rPr lang="en-US" smtClean="0"/>
               <a:pPr/>
-              <a:t>16/3/30</a:t>
+              <a:t>16/3/31</a:t>
             </a:fld>
             <a:endParaRPr lang="en-US"/>
           </a:p>
@@ -3929,7 +3929,7 @@
             <a:fld id="{8E36636D-D922-432D-A958-524484B5923D}" type="datetimeFigureOut">
               <a:rPr lang="en-US" smtClean="0"/>
               <a:pPr/>
-              <a:t>16/3/30</a:t>
+              <a:t>16/3/31</a:t>
             </a:fld>
             <a:endParaRPr lang="en-US"/>
           </a:p>
@@ -4190,7 +4190,7 @@
             <a:fld id="{8E36636D-D922-432D-A958-524484B5923D}" type="datetimeFigureOut">
               <a:rPr lang="en-US" smtClean="0"/>
               <a:pPr/>
-              <a:t>16/3/30</a:t>
+              <a:t>16/3/31</a:t>
             </a:fld>
             <a:endParaRPr lang="en-US"/>
           </a:p>
@@ -4400,7 +4400,7 @@
             <a:fld id="{8E36636D-D922-432D-A958-524484B5923D}" type="datetimeFigureOut">
               <a:rPr lang="en-US" smtClean="0"/>
               <a:pPr/>
-              <a:t>16/3/30</a:t>
+              <a:t>16/3/31</a:t>
             </a:fld>
             <a:endParaRPr lang="en-US"/>
           </a:p>
@@ -5308,23 +5308,7 @@
                   <a:srgbClr val="FFFFFF"/>
                 </a:solidFill>
               </a:rPr>
-              <a:t>实现多实体</a:t>
-            </a:r>
-            <a:r>
-              <a:rPr kumimoji="1" lang="zh-CN" altLang="en-US" dirty="0" smtClean="0">
-                <a:solidFill>
-                  <a:srgbClr val="FFFFFF"/>
-                </a:solidFill>
-              </a:rPr>
-              <a:t>多时间</a:t>
-            </a:r>
-            <a:r>
-              <a:rPr kumimoji="1" lang="zh-CN" altLang="en-US" dirty="0" smtClean="0">
-                <a:solidFill>
-                  <a:srgbClr val="FFFFFF"/>
-                </a:solidFill>
-              </a:rPr>
-              <a:t>片多参数的</a:t>
+              <a:t>实现多实体多时间片多参数的</a:t>
             </a:r>
             <a:r>
               <a:rPr kumimoji="1" lang="zh-CN" altLang="en-US" dirty="0" smtClean="0">
@@ -9502,7 +9486,7 @@
         <p:spPr>
           <a:xfrm>
             <a:off x="228854" y="6294536"/>
-            <a:ext cx="3270246" cy="338554"/>
+            <a:ext cx="3843520" cy="338554"/>
           </a:xfrm>
           <a:prstGeom prst="rect">
             <a:avLst/>
@@ -9517,21 +9501,35 @@
           <a:p>
             <a:r>
               <a:rPr kumimoji="1" lang="zh-CN" altLang="en-US" sz="1600" i="1" dirty="0" smtClean="0"/>
-              <a:t>可视化地址：</a:t>
-            </a:r>
-            <a:r>
-              <a:rPr kumimoji="1" lang="en-US" altLang="zh-CN" sz="1600" i="1" dirty="0" err="1" smtClean="0"/>
-              <a:t>zhanghonglun.cn</a:t>
-            </a:r>
-            <a:r>
-              <a:rPr kumimoji="1" lang="en-US" altLang="zh-CN" sz="1600" i="1" dirty="0" smtClean="0"/>
+              <a:t>可视化地址</a:t>
+            </a:r>
+            <a:r>
+              <a:rPr kumimoji="1" lang="zh-CN" altLang="en-US" sz="1600" i="1" dirty="0" smtClean="0"/>
+              <a:t>：</a:t>
+            </a:r>
+            <a:r>
+              <a:rPr kumimoji="1" lang="en-US" altLang="zh-CN" sz="1600" i="1" dirty="0" smtClean="0">
+                <a:solidFill>
+                  <a:schemeClr val="bg1"/>
+                </a:solidFill>
+                <a:hlinkClick r:id="rId2"/>
+              </a:rPr>
+              <a:t>http://zhanghonglun.cn/ppd</a:t>
+            </a:r>
+            <a:r>
+              <a:rPr kumimoji="1" lang="en-US" altLang="zh-CN" sz="1600" i="1" smtClean="0">
+                <a:solidFill>
+                  <a:schemeClr val="bg1"/>
+                </a:solidFill>
+                <a:hlinkClick r:id="rId2"/>
+              </a:rPr>
               <a:t>/</a:t>
             </a:r>
-            <a:r>
-              <a:rPr kumimoji="1" lang="en-US" altLang="zh-CN" sz="1600" i="1" dirty="0" err="1" smtClean="0"/>
-              <a:t>ppd</a:t>
-            </a:r>
-            <a:endParaRPr kumimoji="1" lang="zh-CN" altLang="en-US" sz="1600" i="1" dirty="0"/>
+            <a:endParaRPr kumimoji="1" lang="zh-CN" altLang="en-US" sz="1600" i="1" dirty="0">
+              <a:solidFill>
+                <a:schemeClr val="bg1"/>
+              </a:solidFill>
+            </a:endParaRPr>
           </a:p>
         </p:txBody>
       </p:sp>
@@ -11904,23 +11902,7 @@
                 <a:ea typeface="Hiragino Sans GB W3"/>
                 <a:cs typeface="Hiragino Sans GB W3"/>
               </a:rPr>
-              <a:t>舆</a:t>
-            </a:r>
-            <a:r>
-              <a:rPr kumimoji="1" lang="zh-CN" altLang="en-US" sz="4000" dirty="0" smtClean="0">
-                <a:latin typeface="Hiragino Sans GB W3"/>
-                <a:ea typeface="Hiragino Sans GB W3"/>
-                <a:cs typeface="Hiragino Sans GB W3"/>
-              </a:rPr>
-              <a:t>情</a:t>
-            </a:r>
-            <a:r>
-              <a:rPr kumimoji="1" lang="zh-CN" altLang="en-US" sz="4000" dirty="0" smtClean="0">
-                <a:latin typeface="Hiragino Sans GB W3"/>
-                <a:ea typeface="Hiragino Sans GB W3"/>
-                <a:cs typeface="Hiragino Sans GB W3"/>
-              </a:rPr>
-              <a:t>感知</a:t>
+              <a:t>舆情感知</a:t>
             </a:r>
             <a:r>
               <a:rPr kumimoji="1" lang="en-US" altLang="zh-CN" sz="4000" dirty="0" smtClean="0">
@@ -13069,15 +13051,7 @@
                   <a:srgbClr val="5093FF"/>
                 </a:solidFill>
               </a:rPr>
-              <a:t>蓝</a:t>
-            </a:r>
-            <a:r>
-              <a:rPr kumimoji="1" lang="zh-CN" altLang="en-US" dirty="0" smtClean="0">
-                <a:solidFill>
-                  <a:srgbClr val="5093FF"/>
-                </a:solidFill>
-              </a:rPr>
-              <a:t>色</a:t>
+              <a:t>蓝色</a:t>
             </a:r>
             <a:r>
               <a:rPr kumimoji="1" lang="zh-CN" altLang="en-US" dirty="0" smtClean="0">

</xml_diff>